<commit_message>
Update Digital Image Processing(DIP).pptx
</commit_message>
<xml_diff>
--- a/Digital Image Processing(DIP).pptx
+++ b/Digital Image Processing(DIP).pptx
@@ -3904,9 +3904,10 @@
           <a:lstStyle/>
           <a:p>
             <a:r>
-              <a:rPr lang="en-US" dirty="0"/>
-              <a:t>Subtitle</a:t>
-            </a:r>
+              <a:rPr lang="en-US" dirty="0" smtClean="0"/>
+              <a:t>SHILPA JOY</a:t>
+            </a:r>
+            <a:endParaRPr lang="en-US" dirty="0"/>
           </a:p>
         </p:txBody>
       </p:sp>
@@ -4785,7 +4786,6 @@
               <a:rPr lang="en-US" dirty="0"/>
               <a:t>   Finger print recognition</a:t>
             </a:r>
-            <a:endParaRPr lang="en-US" dirty="0"/>
           </a:p>
         </p:txBody>
       </p:sp>
@@ -6434,15 +6434,6 @@
 </file>
 
 <file path=customXml/item2.xml><?xml version="1.0" encoding="utf-8"?>
-<?mso-contentType ?>
-<FormTemplates xmlns="http://schemas.microsoft.com/sharepoint/v3/contenttype/forms">
-  <Display>DocumentLibraryForm</Display>
-  <Edit>DocumentLibraryForm</Edit>
-  <New>DocumentLibraryForm</New>
-</FormTemplates>
-</file>
-
-<file path=customXml/item3.xml><?xml version="1.0" encoding="utf-8"?>
 <p:properties xmlns:p="http://schemas.microsoft.com/office/2006/metadata/properties" xmlns:xsi="http://www.w3.org/2001/XMLSchema-instance" xmlns:pc="http://schemas.microsoft.com/office/infopath/2007/PartnerControls">
   <documentManagement>
     <VSO_x0020_item_x0020_id xmlns="40262f94-9f35-4ac3-9a90-690165a166b7" xsi:nil="true"/>
@@ -6451,6 +6442,15 @@
     <Template_x0020_details xmlns="40262f94-9f35-4ac3-9a90-690165a166b7" xsi:nil="true"/>
   </documentManagement>
 </p:properties>
+</file>
+
+<file path=customXml/item3.xml><?xml version="1.0" encoding="utf-8"?>
+<?mso-contentType ?>
+<FormTemplates xmlns="http://schemas.microsoft.com/sharepoint/v3/contenttype/forms">
+  <Display>DocumentLibraryForm</Display>
+  <Edit>DocumentLibraryForm</Edit>
+  <New>DocumentLibraryForm</New>
+</FormTemplates>
 </file>
 
 <file path=customXml/itemProps1.xml><?xml version="1.0" encoding="utf-8"?>
@@ -6473,14 +6473,6 @@
 </file>
 
 <file path=customXml/itemProps2.xml><?xml version="1.0" encoding="utf-8"?>
-<ds:datastoreItem xmlns:ds="http://schemas.openxmlformats.org/officeDocument/2006/customXml" ds:itemID="{05EEE0F9-7BC9-4998-8617-7CC115AD97E2}">
-  <ds:schemaRefs>
-    <ds:schemaRef ds:uri="http://schemas.microsoft.com/sharepoint/v3/contenttype/forms"/>
-  </ds:schemaRefs>
-</ds:datastoreItem>
-</file>
-
-<file path=customXml/itemProps3.xml><?xml version="1.0" encoding="utf-8"?>
 <ds:datastoreItem xmlns:ds="http://schemas.openxmlformats.org/officeDocument/2006/customXml" ds:itemID="{2A1BD8E5-A18E-435C-B431-90A6B59F4B6F}">
   <ds:schemaRefs>
     <ds:schemaRef ds:uri="http://purl.org/dc/elements/1.1/"/>
@@ -6495,4 +6487,12 @@
     <ds:schemaRef ds:uri="http://purl.org/dc/dcmitype/"/>
   </ds:schemaRefs>
 </ds:datastoreItem>
+</file>
+
+<file path=customXml/itemProps3.xml><?xml version="1.0" encoding="utf-8"?>
+<ds:datastoreItem xmlns:ds="http://schemas.openxmlformats.org/officeDocument/2006/customXml" ds:itemID="{05EEE0F9-7BC9-4998-8617-7CC115AD97E2}">
+  <ds:schemaRefs>
+    <ds:schemaRef ds:uri="http://schemas.microsoft.com/sharepoint/v3/contenttype/forms"/>
+  </ds:schemaRefs>
+</ds:datastoreItem>
 </file>
</xml_diff>